<commit_message>
add url to slides
</commit_message>
<xml_diff>
--- a/MTS525.pptx
+++ b/MTS525.pptx
@@ -1214,7 +1214,7 @@
         </p:nvSpPr>
         <p:spPr>
           <a:xfrm>
-            <a:off x="381300" y="685800"/>
+            <a:off x="381000" y="685800"/>
             <a:ext cx="6096000" cy="3429000"/>
           </a:xfrm>
           <a:custGeom>
@@ -20795,7 +20795,7 @@
               <a:buNone/>
             </a:pPr>
             <a:r>
-              <a:rPr lang="en">
+              <a:rPr lang="en" dirty="0">
                 <a:solidFill>
                   <a:srgbClr val="08170F"/>
                 </a:solidFill>
@@ -20806,7 +20806,7 @@
               </a:rPr>
               <a:t>Thank you for your time and attention 🙂</a:t>
             </a:r>
-            <a:endParaRPr>
+            <a:endParaRPr dirty="0">
               <a:solidFill>
                 <a:srgbClr val="08170F"/>
               </a:solidFill>
@@ -20827,7 +20827,7 @@
         <p:spPr>
           <a:xfrm>
             <a:off x="1140350" y="3507700"/>
-            <a:ext cx="5262300" cy="1006500"/>
+            <a:ext cx="5262300" cy="1458831"/>
           </a:xfrm>
           <a:prstGeom prst="rect">
             <a:avLst/>
@@ -20856,7 +20856,7 @@
               <a:buNone/>
             </a:pPr>
             <a:r>
-              <a:rPr lang="en" sz="1200">
+              <a:rPr lang="en" sz="1200" dirty="0">
                 <a:solidFill>
                   <a:srgbClr val="233E30"/>
                 </a:solidFill>
@@ -20867,7 +20867,7 @@
               </a:rPr>
               <a:t>Sarah Thorngate</a:t>
             </a:r>
-            <a:endParaRPr sz="1200">
+            <a:endParaRPr sz="1200" dirty="0">
               <a:solidFill>
                 <a:srgbClr val="233E30"/>
               </a:solidFill>
@@ -20891,7 +20891,7 @@
               <a:buNone/>
             </a:pPr>
             <a:r>
-              <a:rPr lang="en" sz="1200">
+              <a:rPr lang="en" sz="1200" dirty="0">
                 <a:solidFill>
                   <a:srgbClr val="233E30"/>
                 </a:solidFill>
@@ -20902,7 +20902,7 @@
               </a:rPr>
               <a:t>Data Analysis Librarian</a:t>
             </a:r>
-            <a:endParaRPr sz="1200">
+            <a:endParaRPr sz="1200" dirty="0">
               <a:solidFill>
                 <a:srgbClr val="233E30"/>
               </a:solidFill>
@@ -20926,7 +20926,7 @@
               <a:buNone/>
             </a:pPr>
             <a:r>
-              <a:rPr lang="en" sz="1200" u="sng">
+              <a:rPr lang="en" sz="1200" u="sng" dirty="0">
                 <a:solidFill>
                   <a:schemeClr val="hlink"/>
                 </a:solidFill>
@@ -20938,7 +20938,7 @@
               </a:rPr>
               <a:t>sarah.thorngate@northwestern.edu</a:t>
             </a:r>
-            <a:endParaRPr sz="1200">
+            <a:endParaRPr sz="1200" dirty="0">
               <a:solidFill>
                 <a:srgbClr val="233E30"/>
               </a:solidFill>
@@ -20962,7 +20962,7 @@
               <a:buNone/>
             </a:pPr>
             <a:r>
-              <a:rPr lang="en" sz="1200" u="sng">
+              <a:rPr lang="en" sz="1200" u="sng" dirty="0">
                 <a:solidFill>
                   <a:schemeClr val="hlink"/>
                 </a:solidFill>
@@ -20977,7 +20977,90 @@
               </a:rPr>
               <a:t>Make an Appointment</a:t>
             </a:r>
-            <a:endParaRPr sz="1200">
+            <a:endParaRPr lang="en" sz="1200" u="sng" dirty="0">
+              <a:solidFill>
+                <a:schemeClr val="hlink"/>
+              </a:solidFill>
+              <a:highlight>
+                <a:srgbClr val="F4F7F6"/>
+              </a:highlight>
+              <a:latin typeface="Roboto"/>
+              <a:ea typeface="Roboto"/>
+              <a:cs typeface="Roboto"/>
+              <a:sym typeface="Roboto"/>
+            </a:endParaRPr>
+          </a:p>
+          <a:p>
+            <a:pPr marL="457200" lvl="0" indent="0" algn="l" rtl="0">
+              <a:lnSpc>
+                <a:spcPct val="115000"/>
+              </a:lnSpc>
+              <a:spcBef>
+                <a:spcPts val="0"/>
+              </a:spcBef>
+              <a:spcAft>
+                <a:spcPts val="0"/>
+              </a:spcAft>
+              <a:buNone/>
+            </a:pPr>
+            <a:endParaRPr lang="en" sz="1200" u="sng" dirty="0">
+              <a:solidFill>
+                <a:schemeClr val="hlink"/>
+              </a:solidFill>
+              <a:highlight>
+                <a:srgbClr val="F4F7F6"/>
+              </a:highlight>
+              <a:latin typeface="Roboto"/>
+              <a:ea typeface="Roboto"/>
+              <a:cs typeface="Roboto Medium"/>
+              <a:sym typeface="Roboto"/>
+            </a:endParaRPr>
+          </a:p>
+          <a:p>
+            <a:pPr marL="457200" lvl="0" indent="0" algn="l" rtl="0">
+              <a:lnSpc>
+                <a:spcPct val="115000"/>
+              </a:lnSpc>
+              <a:spcBef>
+                <a:spcPts val="0"/>
+              </a:spcBef>
+              <a:spcAft>
+                <a:spcPts val="0"/>
+              </a:spcAft>
+              <a:buNone/>
+            </a:pPr>
+            <a:r>
+              <a:rPr lang="en" sz="1200" dirty="0">
+                <a:solidFill>
+                  <a:schemeClr val="tx1"/>
+                </a:solidFill>
+                <a:highlight>
+                  <a:srgbClr val="F4F7F6"/>
+                </a:highlight>
+                <a:latin typeface="Roboto"/>
+                <a:ea typeface="Roboto"/>
+                <a:cs typeface="Roboto Medium"/>
+                <a:sym typeface="Roboto"/>
+              </a:rPr>
+              <a:t>Slides and materials: </a:t>
+            </a:r>
+            <a:r>
+              <a:rPr lang="en-US" sz="1200" u="sng" dirty="0">
+                <a:solidFill>
+                  <a:schemeClr val="hlink"/>
+                </a:solidFill>
+                <a:highlight>
+                  <a:srgbClr val="F4F7F6"/>
+                </a:highlight>
+                <a:latin typeface="Roboto"/>
+                <a:ea typeface="Roboto"/>
+                <a:cs typeface="Roboto Medium"/>
+                <a:sym typeface="Roboto"/>
+                <a:hlinkClick r:id="rId5"/>
+              </a:rPr>
+              <a:t>https://github.com/scthorn/NLSY97_majors</a:t>
+            </a:r>
+            <a:endParaRPr sz="1200" dirty="0">
               <a:solidFill>
                 <a:srgbClr val="233E30"/>
               </a:solidFill>

</xml_diff>